<commit_message>
Update TechWritingSpeaking2.0 PDF and PPTX files
Replaced the existing TechWritingSpeaking2.0.pdf and TechWritingSpeaking2.0.pptx files in the CS373 directory with updated versions.
</commit_message>
<xml_diff>
--- a/files/CS373/TechWritingSpeaking2.0.pptx
+++ b/files/CS373/TechWritingSpeaking2.0.pptx
@@ -6464,8 +6464,8 @@
         </p:nvSpPr>
         <p:spPr bwMode="auto">
           <a:xfrm>
-            <a:off x="3276600" y="4953000"/>
-            <a:ext cx="762000" cy="228600"/>
+            <a:off x="3247584" y="4991100"/>
+            <a:ext cx="762000" cy="114300"/>
           </a:xfrm>
           <a:prstGeom prst="rect">
             <a:avLst/>
@@ -6537,8 +6537,8 @@
         </p:nvSpPr>
         <p:spPr bwMode="auto">
           <a:xfrm>
-            <a:off x="599066" y="4271275"/>
-            <a:ext cx="762000" cy="228600"/>
+            <a:off x="609600" y="4283485"/>
+            <a:ext cx="533400" cy="148325"/>
           </a:xfrm>
           <a:prstGeom prst="rect">
             <a:avLst/>
@@ -6611,7 +6611,7 @@
         <p:spPr bwMode="auto">
           <a:xfrm>
             <a:off x="6500756" y="3962400"/>
-            <a:ext cx="762000" cy="228600"/>
+            <a:ext cx="509644" cy="152400"/>
           </a:xfrm>
           <a:prstGeom prst="rect">
             <a:avLst/>
@@ -6683,8 +6683,8 @@
         </p:nvSpPr>
         <p:spPr bwMode="auto">
           <a:xfrm>
-            <a:off x="5334000" y="4800600"/>
-            <a:ext cx="762000" cy="228600"/>
+            <a:off x="5410200" y="4876800"/>
+            <a:ext cx="609600" cy="114300"/>
           </a:xfrm>
           <a:prstGeom prst="rect">
             <a:avLst/>
@@ -7472,7 +7472,7 @@
         </p:nvSpPr>
         <p:spPr>
           <a:xfrm>
-            <a:off x="202481" y="1441295"/>
+            <a:off x="47873" y="1282390"/>
             <a:ext cx="4572000" cy="4648200"/>
           </a:xfrm>
         </p:spPr>
@@ -7484,40 +7484,40 @@
               <a:buNone/>
             </a:pPr>
             <a:r>
-              <a:rPr lang="en-US" dirty="0"/>
+              <a:rPr lang="en-US" sz="2800" dirty="0"/>
               <a:t>Figures:</a:t>
             </a:r>
           </a:p>
           <a:p>
             <a:r>
-              <a:rPr lang="en-US" dirty="0"/>
+              <a:rPr lang="en-US" sz="2800" dirty="0"/>
               <a:t>Graphs: </a:t>
             </a:r>
           </a:p>
           <a:p>
             <a:pPr lvl="1"/>
             <a:r>
-              <a:rPr lang="en-US" dirty="0"/>
+              <a:rPr lang="en-US" sz="2400" dirty="0"/>
               <a:t>Clearly label units, legend, title</a:t>
             </a:r>
           </a:p>
           <a:p>
             <a:r>
-              <a:rPr lang="en-US" dirty="0"/>
+              <a:rPr lang="en-US" sz="2800" dirty="0"/>
               <a:t>Captions: </a:t>
             </a:r>
           </a:p>
           <a:p>
             <a:pPr lvl="1"/>
             <a:r>
-              <a:rPr lang="en-US" dirty="0"/>
+              <a:rPr lang="en-US" sz="2400" dirty="0"/>
               <a:t>Explain the figure in summary</a:t>
             </a:r>
           </a:p>
           <a:p>
             <a:pPr lvl="1"/>
             <a:r>
-              <a:rPr lang="en-US" dirty="0"/>
+              <a:rPr lang="en-US" sz="2400" dirty="0"/>
               <a:t>2-3 sentences that tell the story of the figure</a:t>
             </a:r>
           </a:p>
@@ -7673,6 +7673,125 @@
           </a:p>
         </p:txBody>
       </p:sp>
+      <p:sp>
+        <p:nvSpPr>
+          <p:cNvPr id="6" name="TextBox 5">
+            <a:extLst>
+              <a:ext uri="{FF2B5EF4-FFF2-40B4-BE49-F238E27FC236}">
+                <a16:creationId xmlns:a16="http://schemas.microsoft.com/office/drawing/2014/main" id="{C96E51CE-70AD-D6E1-7296-9B6626306C43}"/>
+              </a:ext>
+            </a:extLst>
+          </p:cNvPr>
+          <p:cNvSpPr txBox="1"/>
+          <p:nvPr/>
+        </p:nvSpPr>
+        <p:spPr>
+          <a:xfrm>
+            <a:off x="4194221" y="4494074"/>
+            <a:ext cx="4891083" cy="1754326"/>
+          </a:xfrm>
+          <a:prstGeom prst="rect">
+            <a:avLst/>
+          </a:prstGeom>
+        </p:spPr>
+        <p:style>
+          <a:lnRef idx="2">
+            <a:schemeClr val="dk1"/>
+          </a:lnRef>
+          <a:fillRef idx="1">
+            <a:schemeClr val="lt1"/>
+          </a:fillRef>
+          <a:effectRef idx="0">
+            <a:schemeClr val="dk1"/>
+          </a:effectRef>
+          <a:fontRef idx="minor">
+            <a:schemeClr val="dk1"/>
+          </a:fontRef>
+        </p:style>
+        <p:txBody>
+          <a:bodyPr wrap="none" rtlCol="0">
+            <a:spAutoFit/>
+          </a:bodyPr>
+          <a:lstStyle/>
+          <a:p>
+            <a:r>
+              <a:rPr lang="en-US" sz="1200" dirty="0"/>
+              <a:t>Tips for Writing Strong Stand-Alone Captions</a:t>
+            </a:r>
+          </a:p>
+          <a:p>
+            <a:endParaRPr lang="en-US" sz="1200" dirty="0"/>
+          </a:p>
+          <a:p>
+            <a:pPr marL="171450" indent="-171450">
+              <a:buFont typeface="Arial" panose="020B0604020202020204" pitchFamily="34" charset="0"/>
+              <a:buChar char="•"/>
+            </a:pPr>
+            <a:r>
+              <a:rPr lang="en-US" sz="1200" dirty="0"/>
+              <a:t>Start with context: What is being shown and why?</a:t>
+            </a:r>
+          </a:p>
+          <a:p>
+            <a:pPr marL="171450" indent="-171450">
+              <a:buFont typeface="Arial" panose="020B0604020202020204" pitchFamily="34" charset="0"/>
+              <a:buChar char="•"/>
+            </a:pPr>
+            <a:r>
+              <a:rPr lang="en-US" sz="1200" dirty="0"/>
+              <a:t>Describe the method or metric: How was the data obtained or calculated?</a:t>
+            </a:r>
+          </a:p>
+          <a:p>
+            <a:pPr marL="171450" indent="-171450">
+              <a:buFont typeface="Arial" panose="020B0604020202020204" pitchFamily="34" charset="0"/>
+              <a:buChar char="•"/>
+            </a:pPr>
+            <a:r>
+              <a:rPr lang="en-US" sz="1200" dirty="0"/>
+              <a:t>Interpret the result: What should the reader take away?</a:t>
+            </a:r>
+          </a:p>
+          <a:p>
+            <a:pPr marL="171450" indent="-171450">
+              <a:buFont typeface="Arial" panose="020B0604020202020204" pitchFamily="34" charset="0"/>
+              <a:buChar char="•"/>
+            </a:pPr>
+            <a:r>
+              <a:rPr lang="en-US" sz="1200" dirty="0"/>
+              <a:t>Reference if needed: Optionally tie to the main text for deeper details.</a:t>
+            </a:r>
+          </a:p>
+          <a:p>
+            <a:endParaRPr lang="en-US" sz="1200" dirty="0"/>
+          </a:p>
+          <a:p>
+            <a:r>
+              <a:rPr lang="en-US" sz="1200" dirty="0"/>
+              <a:t>See this webpage:</a:t>
+            </a:r>
+          </a:p>
+          <a:p>
+            <a:r>
+              <a:rPr lang="en-US" sz="1200" dirty="0">
+                <a:hlinkClick r:id="rId3"/>
+              </a:rPr>
+              <a:t>https://maherou.github.io/Teaching/files/CS373/CaptionsThatWork</a:t>
+            </a:r>
+            <a:r>
+              <a:rPr lang="en-US" sz="1200">
+                <a:hlinkClick r:id="rId3"/>
+              </a:rPr>
+              <a:t>/</a:t>
+            </a:r>
+            <a:r>
+              <a:rPr lang="en-US" sz="1200"/>
+              <a:t> </a:t>
+            </a:r>
+            <a:endParaRPr lang="en-US" sz="1200" dirty="0"/>
+          </a:p>
+        </p:txBody>
+      </p:sp>
     </p:spTree>
     <p:extLst>
       <p:ext uri="{BB962C8B-B14F-4D97-AF65-F5344CB8AC3E}">
@@ -8099,7 +8218,7 @@
 <file path=ppt/theme/theme1.xml><?xml version="1.0" encoding="utf-8"?>
 <a:theme xmlns:a="http://schemas.openxmlformats.org/drawingml/2006/main" name="Blank Presentation">
   <a:themeElements>
-    <a:clrScheme name="Blank Presentation 1">
+    <a:clrScheme name="Custom 1">
       <a:dk1>
         <a:srgbClr val="000000"/>
       </a:dk1>
@@ -8131,7 +8250,7 @@
         <a:srgbClr val="2D2DB9"/>
       </a:accent6>
       <a:hlink>
-        <a:srgbClr val="CCCCFF"/>
+        <a:srgbClr val="2B2BFF"/>
       </a:hlink>
       <a:folHlink>
         <a:srgbClr val="B2B2B2"/>

</xml_diff>